<commit_message>
update ppt 11 12
</commit_message>
<xml_diff>
--- a/课程ppt/第10讲 JS-SDK.pptx
+++ b/课程ppt/第10讲 JS-SDK.pptx
@@ -29,10 +29,10 @@
     <p:sldId id="483" r:id="rId17"/>
     <p:sldId id="484" r:id="rId18"/>
     <p:sldId id="456" r:id="rId19"/>
-    <p:sldId id="490" r:id="rId20"/>
-    <p:sldId id="491" r:id="rId21"/>
-    <p:sldId id="492" r:id="rId22"/>
-    <p:sldId id="488" r:id="rId23"/>
+    <p:sldId id="493" r:id="rId20"/>
+    <p:sldId id="490" r:id="rId21"/>
+    <p:sldId id="491" r:id="rId22"/>
+    <p:sldId id="492" r:id="rId23"/>
     <p:sldId id="489" r:id="rId24"/>
     <p:sldId id="452" r:id="rId25"/>
     <p:sldId id="474" r:id="rId26"/>
@@ -274,7 +274,7 @@
           <a:p>
             <a:fld id="{2B71C804-97F5-4B36-A7AC-EEEC7F44F6C2}" type="datetimeFigureOut">
               <a:rPr lang="zh-CN" altLang="en-US" smtClean="0"/>
-              <a:t>2017/8/30</a:t>
+              <a:t>2017/9/1</a:t>
             </a:fld>
             <a:endParaRPr lang="zh-CN" altLang="en-US"/>
           </a:p>
@@ -440,7 +440,7 @@
           <a:p>
             <a:fld id="{0568D9C6-D8DC-4CC3-8480-E0C4DBA1CC07}" type="datetimeFigureOut">
               <a:rPr lang="zh-CN" altLang="en-US" smtClean="0"/>
-              <a:t>2017/8/30</a:t>
+              <a:t>2017/9/1</a:t>
             </a:fld>
             <a:endParaRPr lang="zh-CN" altLang="en-US"/>
           </a:p>
@@ -1053,7 +1053,7 @@
           <a:p>
             <a:fld id="{DB9D664F-4C68-42D2-B189-678958EFAFDA}" type="datetime1">
               <a:rPr lang="zh-CN" altLang="en-US" smtClean="0"/>
-              <a:t>2017/8/30</a:t>
+              <a:t>2017/9/1</a:t>
             </a:fld>
             <a:endParaRPr lang="zh-CN" altLang="en-US"/>
           </a:p>
@@ -2035,7 +2035,7 @@
           <a:p>
             <a:fld id="{ED5513C8-E3A4-4D78-B249-887659A958FF}" type="datetime1">
               <a:rPr lang="en-US" altLang="zh-CN" smtClean="0"/>
-              <a:t>8/30/2017</a:t>
+              <a:t>9/1/2017</a:t>
             </a:fld>
             <a:endParaRPr lang="en-US"/>
           </a:p>
@@ -2213,7 +2213,7 @@
           <a:p>
             <a:fld id="{EBEDA52C-3EEE-4289-818C-901C0A7814FE}" type="datetime1">
               <a:rPr lang="en-US" altLang="zh-CN" smtClean="0"/>
-              <a:t>8/30/2017</a:t>
+              <a:t>9/1/2017</a:t>
             </a:fld>
             <a:endParaRPr lang="en-US"/>
           </a:p>
@@ -2467,7 +2467,7 @@
           <a:p>
             <a:fld id="{09EF5D7F-EA15-485C-85DD-8FDC010A62D4}" type="datetime1">
               <a:rPr lang="en-US" altLang="zh-CN" smtClean="0"/>
-              <a:t>8/30/2017</a:t>
+              <a:t>9/1/2017</a:t>
             </a:fld>
             <a:endParaRPr lang="en-US"/>
           </a:p>
@@ -2707,7 +2707,7 @@
           <a:p>
             <a:fld id="{9541C2B2-0BAB-4CD4-83EE-25F1A7138896}" type="datetime1">
               <a:rPr lang="en-US" altLang="zh-CN" smtClean="0"/>
-              <a:t>8/30/2017</a:t>
+              <a:t>9/1/2017</a:t>
             </a:fld>
             <a:endParaRPr lang="en-US"/>
           </a:p>
@@ -3082,7 +3082,7 @@
           <a:p>
             <a:fld id="{7DEA23E7-D0FC-41DC-8745-BE6FC447B182}" type="datetime1">
               <a:rPr lang="en-US" altLang="zh-CN" smtClean="0"/>
-              <a:t>8/30/2017</a:t>
+              <a:t>9/1/2017</a:t>
             </a:fld>
             <a:endParaRPr lang="en-US"/>
           </a:p>
@@ -3867,7 +3867,7 @@
           <a:p>
             <a:fld id="{5DEA8378-5F33-490B-8120-8DE6B7EE2781}" type="datetime1">
               <a:rPr lang="en-US" altLang="zh-CN" smtClean="0"/>
-              <a:t>8/30/2017</a:t>
+              <a:t>9/1/2017</a:t>
             </a:fld>
             <a:endParaRPr lang="en-US"/>
           </a:p>
@@ -4121,7 +4121,7 @@
           <a:p>
             <a:fld id="{38DD30CF-78A7-4C73-91B4-38D3E3317745}" type="datetime1">
               <a:rPr lang="en-US" altLang="zh-CN" smtClean="0"/>
-              <a:t>8/30/2017</a:t>
+              <a:t>9/1/2017</a:t>
             </a:fld>
             <a:endParaRPr lang="en-US"/>
           </a:p>
@@ -4224,7 +4224,7 @@
           <a:p>
             <a:fld id="{A1BE0A72-8501-4974-A7B7-5BD248ABBAFC}" type="datetime1">
               <a:rPr lang="zh-CN" altLang="en-US" smtClean="0"/>
-              <a:t>2017/8/30</a:t>
+              <a:t>2017/9/1</a:t>
             </a:fld>
             <a:endParaRPr lang="zh-CN" altLang="en-US"/>
           </a:p>
@@ -4485,7 +4485,7 @@
           <a:p>
             <a:fld id="{0B7E01DD-16D0-4DBA-9C1A-51468BA0B73A}" type="datetime1">
               <a:rPr lang="en-US" altLang="zh-CN" smtClean="0"/>
-              <a:t>8/30/2017</a:t>
+              <a:t>9/1/2017</a:t>
             </a:fld>
             <a:endParaRPr lang="en-US"/>
           </a:p>
@@ -4663,7 +4663,7 @@
           <a:p>
             <a:fld id="{B587E63F-0E62-4A50-901F-E071D77F7634}" type="datetime1">
               <a:rPr lang="en-US" altLang="zh-CN" smtClean="0"/>
-              <a:t>8/30/2017</a:t>
+              <a:t>9/1/2017</a:t>
             </a:fld>
             <a:endParaRPr lang="en-US"/>
           </a:p>
@@ -4851,7 +4851,7 @@
           <a:p>
             <a:fld id="{BD8521E8-9297-400B-AD8C-0A4D05699D33}" type="datetime1">
               <a:rPr lang="en-US" altLang="zh-CN" smtClean="0"/>
-              <a:t>8/30/2017</a:t>
+              <a:t>9/1/2017</a:t>
             </a:fld>
             <a:endParaRPr lang="en-US"/>
           </a:p>
@@ -5082,7 +5082,7 @@
           <a:p>
             <a:fld id="{ED5513C8-E3A4-4D78-B249-887659A958FF}" type="datetime1">
               <a:rPr lang="en-US" altLang="zh-CN" smtClean="0"/>
-              <a:t>8/30/2017</a:t>
+              <a:t>9/1/2017</a:t>
             </a:fld>
             <a:endParaRPr lang="en-US"/>
           </a:p>
@@ -5260,7 +5260,7 @@
           <a:p>
             <a:fld id="{EBEDA52C-3EEE-4289-818C-901C0A7814FE}" type="datetime1">
               <a:rPr lang="en-US" altLang="zh-CN" smtClean="0"/>
-              <a:t>8/30/2017</a:t>
+              <a:t>9/1/2017</a:t>
             </a:fld>
             <a:endParaRPr lang="en-US"/>
           </a:p>
@@ -5514,7 +5514,7 @@
           <a:p>
             <a:fld id="{09EF5D7F-EA15-485C-85DD-8FDC010A62D4}" type="datetime1">
               <a:rPr lang="en-US" altLang="zh-CN" smtClean="0"/>
-              <a:t>8/30/2017</a:t>
+              <a:t>9/1/2017</a:t>
             </a:fld>
             <a:endParaRPr lang="en-US"/>
           </a:p>
@@ -5754,7 +5754,7 @@
           <a:p>
             <a:fld id="{9541C2B2-0BAB-4CD4-83EE-25F1A7138896}" type="datetime1">
               <a:rPr lang="en-US" altLang="zh-CN" smtClean="0"/>
-              <a:t>8/30/2017</a:t>
+              <a:t>9/1/2017</a:t>
             </a:fld>
             <a:endParaRPr lang="en-US"/>
           </a:p>
@@ -6129,7 +6129,7 @@
           <a:p>
             <a:fld id="{7DEA23E7-D0FC-41DC-8745-BE6FC447B182}" type="datetime1">
               <a:rPr lang="en-US" altLang="zh-CN" smtClean="0"/>
-              <a:t>8/30/2017</a:t>
+              <a:t>9/1/2017</a:t>
             </a:fld>
             <a:endParaRPr lang="en-US"/>
           </a:p>
@@ -6914,7 +6914,7 @@
           <a:p>
             <a:fld id="{A1BE0A72-8501-4974-A7B7-5BD248ABBAFC}" type="datetime1">
               <a:rPr lang="zh-CN" altLang="en-US" smtClean="0"/>
-              <a:t>2017/8/30</a:t>
+              <a:t>2017/9/1</a:t>
             </a:fld>
             <a:endParaRPr lang="zh-CN" altLang="en-US"/>
           </a:p>
@@ -6967,7 +6967,7 @@
           <a:p>
             <a:fld id="{5DEA8378-5F33-490B-8120-8DE6B7EE2781}" type="datetime1">
               <a:rPr lang="en-US" altLang="zh-CN" smtClean="0"/>
-              <a:t>8/30/2017</a:t>
+              <a:t>9/1/2017</a:t>
             </a:fld>
             <a:endParaRPr lang="en-US"/>
           </a:p>
@@ -7221,7 +7221,7 @@
           <a:p>
             <a:fld id="{38DD30CF-78A7-4C73-91B4-38D3E3317745}" type="datetime1">
               <a:rPr lang="en-US" altLang="zh-CN" smtClean="0"/>
-              <a:t>8/30/2017</a:t>
+              <a:t>9/1/2017</a:t>
             </a:fld>
             <a:endParaRPr lang="en-US"/>
           </a:p>
@@ -7486,7 +7486,7 @@
           <a:p>
             <a:fld id="{0B7E01DD-16D0-4DBA-9C1A-51468BA0B73A}" type="datetime1">
               <a:rPr lang="en-US" altLang="zh-CN" smtClean="0"/>
-              <a:t>8/30/2017</a:t>
+              <a:t>9/1/2017</a:t>
             </a:fld>
             <a:endParaRPr lang="en-US"/>
           </a:p>
@@ -7664,7 +7664,7 @@
           <a:p>
             <a:fld id="{B587E63F-0E62-4A50-901F-E071D77F7634}" type="datetime1">
               <a:rPr lang="en-US" altLang="zh-CN" smtClean="0"/>
-              <a:t>8/30/2017</a:t>
+              <a:t>9/1/2017</a:t>
             </a:fld>
             <a:endParaRPr lang="en-US"/>
           </a:p>
@@ -7852,7 +7852,7 @@
           <a:p>
             <a:fld id="{BD8521E8-9297-400B-AD8C-0A4D05699D33}" type="datetime1">
               <a:rPr lang="en-US" altLang="zh-CN" smtClean="0"/>
-              <a:t>8/30/2017</a:t>
+              <a:t>9/1/2017</a:t>
             </a:fld>
             <a:endParaRPr lang="en-US"/>
           </a:p>
@@ -7955,7 +7955,7 @@
           <a:p>
             <a:fld id="{EF452D9C-F9EB-4417-9C3A-C876C2AF9415}" type="datetime1">
               <a:rPr lang="zh-CN" altLang="en-US" smtClean="0"/>
-              <a:t>2017/8/30</a:t>
+              <a:t>2017/9/1</a:t>
             </a:fld>
             <a:endParaRPr lang="zh-CN" altLang="en-US"/>
           </a:p>
@@ -8141,7 +8141,7 @@
           <a:p>
             <a:fld id="{2F2E9289-9B4C-49AE-BDDA-70D6EDC89D17}" type="datetime1">
               <a:rPr lang="zh-CN" altLang="en-US" smtClean="0"/>
-              <a:t>2017/8/30</a:t>
+              <a:t>2017/9/1</a:t>
             </a:fld>
             <a:endParaRPr lang="zh-CN" altLang="en-US"/>
           </a:p>
@@ -8311,7 +8311,7 @@
           <a:p>
             <a:fld id="{2F2E9289-9B4C-49AE-BDDA-70D6EDC89D17}" type="datetime1">
               <a:rPr lang="zh-CN" altLang="en-US" smtClean="0"/>
-              <a:t>2017/8/30</a:t>
+              <a:t>2017/9/1</a:t>
             </a:fld>
             <a:endParaRPr lang="zh-CN" altLang="en-US"/>
           </a:p>
@@ -8547,7 +8547,7 @@
           <a:p>
             <a:fld id="{8C5BA751-A251-47D6-8494-C134D9EBED5F}" type="datetime1">
               <a:rPr lang="zh-CN" altLang="en-US" smtClean="0"/>
-              <a:t>2017/8/30</a:t>
+              <a:t>2017/9/1</a:t>
             </a:fld>
             <a:endParaRPr lang="zh-CN" altLang="en-US"/>
           </a:p>
@@ -8903,7 +8903,7 @@
           <a:p>
             <a:fld id="{C46E2078-F302-4651-A2A2-2FC6C4E1A3F1}" type="datetime1">
               <a:rPr lang="zh-CN" altLang="en-US" smtClean="0"/>
-              <a:t>2017/8/30</a:t>
+              <a:t>2017/9/1</a:t>
             </a:fld>
             <a:endParaRPr lang="zh-CN" altLang="en-US"/>
           </a:p>
@@ -9025,7 +9025,7 @@
               <a:pPr>
                 <a:defRPr/>
               </a:pPr>
-              <a:t>2017/8/30</a:t>
+              <a:t>2017/9/1</a:t>
             </a:fld>
             <a:endParaRPr lang="zh-CN" altLang="en-US"/>
           </a:p>
@@ -9173,7 +9173,7 @@
           <a:p>
             <a:fld id="{A1BE0A72-8501-4974-A7B7-5BD248ABBAFC}" type="datetime1">
               <a:rPr lang="zh-CN" altLang="en-US" smtClean="0"/>
-              <a:t>2017/8/30</a:t>
+              <a:t>2017/9/1</a:t>
             </a:fld>
             <a:endParaRPr lang="zh-CN" altLang="en-US"/>
           </a:p>
@@ -9687,7 +9687,7 @@
           <a:p>
             <a:fld id="{A1BE0A72-8501-4974-A7B7-5BD248ABBAFC}" type="datetime1">
               <a:rPr lang="zh-CN" altLang="en-US" smtClean="0"/>
-              <a:t>2017/8/30</a:t>
+              <a:t>2017/9/1</a:t>
             </a:fld>
             <a:endParaRPr lang="zh-CN" altLang="en-US"/>
           </a:p>
@@ -10293,7 +10293,7 @@
           <a:p>
             <a:fld id="{7A78726F-0AD2-4A20-BC72-263D2D3F3A2F}" type="datetime1">
               <a:rPr lang="en-US" altLang="zh-CN" smtClean="0"/>
-              <a:t>8/30/2017</a:t>
+              <a:t>9/1/2017</a:t>
             </a:fld>
             <a:endParaRPr lang="en-US"/>
           </a:p>
@@ -11274,7 +11274,7 @@
           <a:p>
             <a:fld id="{A1BE0A72-8501-4974-A7B7-5BD248ABBAFC}" type="datetime1">
               <a:rPr lang="zh-CN" altLang="en-US" smtClean="0"/>
-              <a:t>2017/8/30</a:t>
+              <a:t>2017/9/1</a:t>
             </a:fld>
             <a:endParaRPr lang="zh-CN" altLang="en-US"/>
           </a:p>
@@ -11880,7 +11880,7 @@
           <a:p>
             <a:fld id="{7A78726F-0AD2-4A20-BC72-263D2D3F3A2F}" type="datetime1">
               <a:rPr lang="en-US" altLang="zh-CN" smtClean="0"/>
-              <a:t>8/30/2017</a:t>
+              <a:t>9/1/2017</a:t>
             </a:fld>
             <a:endParaRPr lang="en-US"/>
           </a:p>
@@ -13895,7 +13895,7 @@
           <a:p>
             <a:r>
               <a:rPr lang="zh-CN" altLang="en-US" b="0" dirty="0"/>
-              <a:t>选择图像接口</a:t>
+              <a:t>分享给朋友接口</a:t>
             </a:r>
           </a:p>
         </p:txBody>
@@ -13903,7 +13903,7 @@
     </p:spTree>
     <p:extLst>
       <p:ext uri="{BB962C8B-B14F-4D97-AF65-F5344CB8AC3E}">
-        <p14:creationId xmlns:p14="http://schemas.microsoft.com/office/powerpoint/2010/main" val="2744694590"/>
+        <p14:creationId xmlns:p14="http://schemas.microsoft.com/office/powerpoint/2010/main" val="3627056431"/>
       </p:ext>
     </p:extLst>
   </p:cSld>
@@ -13952,7 +13952,7 @@
           <a:p>
             <a:r>
               <a:rPr lang="zh-CN" altLang="en-US" b="0" dirty="0"/>
-              <a:t>上传图像接口</a:t>
+              <a:t>选择图像接口</a:t>
             </a:r>
           </a:p>
         </p:txBody>
@@ -13960,7 +13960,7 @@
     </p:spTree>
     <p:extLst>
       <p:ext uri="{BB962C8B-B14F-4D97-AF65-F5344CB8AC3E}">
-        <p14:creationId xmlns:p14="http://schemas.microsoft.com/office/powerpoint/2010/main" val="480444120"/>
+        <p14:creationId xmlns:p14="http://schemas.microsoft.com/office/powerpoint/2010/main" val="2744694590"/>
       </p:ext>
     </p:extLst>
   </p:cSld>
@@ -14008,12 +14008,8 @@
           <a:lstStyle/>
           <a:p>
             <a:r>
-              <a:rPr lang="zh-CN" altLang="en-US" b="0"/>
-              <a:t>显示图像</a:t>
-            </a:r>
-            <a:r>
               <a:rPr lang="zh-CN" altLang="en-US" b="0" dirty="0"/>
-              <a:t>接口</a:t>
+              <a:t>上传图像接口</a:t>
             </a:r>
           </a:p>
         </p:txBody>
@@ -14021,7 +14017,7 @@
     </p:spTree>
     <p:extLst>
       <p:ext uri="{BB962C8B-B14F-4D97-AF65-F5344CB8AC3E}">
-        <p14:creationId xmlns:p14="http://schemas.microsoft.com/office/powerpoint/2010/main" val="2502221667"/>
+        <p14:creationId xmlns:p14="http://schemas.microsoft.com/office/powerpoint/2010/main" val="480444120"/>
       </p:ext>
     </p:extLst>
   </p:cSld>
@@ -14069,8 +14065,12 @@
           <a:lstStyle/>
           <a:p>
             <a:r>
+              <a:rPr lang="zh-CN" altLang="en-US" b="0"/>
+              <a:t>显示图像</a:t>
+            </a:r>
+            <a:r>
               <a:rPr lang="zh-CN" altLang="en-US" b="0" dirty="0"/>
-              <a:t>分享给朋友接口</a:t>
+              <a:t>接口</a:t>
             </a:r>
           </a:p>
         </p:txBody>
@@ -14078,7 +14078,7 @@
     </p:spTree>
     <p:extLst>
       <p:ext uri="{BB962C8B-B14F-4D97-AF65-F5344CB8AC3E}">
-        <p14:creationId xmlns:p14="http://schemas.microsoft.com/office/powerpoint/2010/main" val="1292342844"/>
+        <p14:creationId xmlns:p14="http://schemas.microsoft.com/office/powerpoint/2010/main" val="2502221667"/>
       </p:ext>
     </p:extLst>
   </p:cSld>

</xml_diff>